<commit_message>
One more lesson learned added.
Signed-off-by: Guillaume <guillaume.joyet@unibas.ch>
</commit_message>
<xml_diff>
--- a/00_General/Presentation/MS 5/Presentation_Milestone_v_Master.pptx
+++ b/00_General/Presentation/MS 5/Presentation_Milestone_v_Master.pptx
@@ -533,7 +533,7 @@
         <p:spPr>
           <a:xfrm>
             <a:off x="1524000" y="3602037"/>
-            <a:ext cx="9144000" cy="1655767"/>
+            <a:ext cx="9144000" cy="1655768"/>
           </a:xfrm>
           <a:prstGeom prst="rect">
             <a:avLst/>
@@ -1333,7 +1333,7 @@
         <p:spPr>
           <a:xfrm>
             <a:off x="831850" y="4589462"/>
-            <a:ext cx="10515600" cy="1500192"/>
+            <a:ext cx="10515600" cy="1500193"/>
           </a:xfrm>
           <a:prstGeom prst="rect">
             <a:avLst/>
@@ -1636,7 +1636,7 @@
         <p:spPr>
           <a:xfrm>
             <a:off x="839787" y="1681163"/>
-            <a:ext cx="5157790" cy="823917"/>
+            <a:ext cx="5157790" cy="823918"/>
           </a:xfrm>
           <a:prstGeom prst="rect">
             <a:avLst/>
@@ -2143,8 +2143,8 @@
         </p:nvSpPr>
         <p:spPr>
           <a:xfrm>
-            <a:off x="11089824" y="6404294"/>
-            <a:ext cx="263979" cy="269237"/>
+            <a:off x="11089825" y="6404294"/>
+            <a:ext cx="263978" cy="269237"/>
           </a:xfrm>
           <a:prstGeom prst="rect">
             <a:avLst/>
@@ -3017,7 +3017,7 @@
         <p:spPr>
           <a:xfrm>
             <a:off x="611423" y="473693"/>
-            <a:ext cx="6348578" cy="5345861"/>
+            <a:ext cx="6348578" cy="5345860"/>
           </a:xfrm>
           <a:prstGeom prst="rect">
             <a:avLst/>
@@ -3145,10 +3145,7 @@
               </a:defRPr>
             </a:pPr>
             <a:r>
-              <a:t>Gruppe:</a:t>
-            </a:r>
-            <a:r>
-              <a:t>  </a:t>
+              <a:t>Gruppe:  </a:t>
             </a:r>
             <a:r>
               <a:rPr sz="3200"/>
@@ -3428,8 +3425,8 @@
         </p:blipFill>
         <p:spPr>
           <a:xfrm>
-            <a:off x="611422" y="4067416"/>
-            <a:ext cx="731507" cy="731511"/>
+            <a:off x="611421" y="4067416"/>
+            <a:ext cx="731508" cy="731512"/>
           </a:xfrm>
           <a:prstGeom prst="rect">
             <a:avLst/>
@@ -3457,8 +3454,8 @@
         </p:blipFill>
         <p:spPr>
           <a:xfrm>
-            <a:off x="611422" y="3375143"/>
-            <a:ext cx="731507" cy="731511"/>
+            <a:off x="611421" y="3375142"/>
+            <a:ext cx="731508" cy="731512"/>
           </a:xfrm>
           <a:prstGeom prst="rect">
             <a:avLst/>
@@ -3486,8 +3483,8 @@
         </p:blipFill>
         <p:spPr>
           <a:xfrm>
-            <a:off x="611422" y="4713077"/>
-            <a:ext cx="731507" cy="731507"/>
+            <a:off x="611421" y="4713077"/>
+            <a:ext cx="731508" cy="731508"/>
           </a:xfrm>
           <a:prstGeom prst="rect">
             <a:avLst/>
@@ -3515,8 +3512,8 @@
         </p:blipFill>
         <p:spPr>
           <a:xfrm>
-            <a:off x="611422" y="5343712"/>
-            <a:ext cx="731507" cy="731511"/>
+            <a:off x="611421" y="5343711"/>
+            <a:ext cx="731508" cy="731512"/>
           </a:xfrm>
           <a:prstGeom prst="rect">
             <a:avLst/>
@@ -3544,8 +3541,8 @@
         </p:blipFill>
         <p:spPr>
           <a:xfrm>
-            <a:off x="4522011" y="2342665"/>
-            <a:ext cx="905123" cy="860506"/>
+            <a:off x="4522011" y="2342664"/>
+            <a:ext cx="905124" cy="860507"/>
           </a:xfrm>
           <a:prstGeom prst="rect">
             <a:avLst/>
@@ -3720,22 +3717,15 @@
           <a:bodyPr lIns="45718" tIns="45718" rIns="45718" bIns="45718">
             <a:spAutoFit/>
           </a:bodyPr>
-          <a:lstStyle/>
-          <a:p>
-            <a:pPr algn="ctr">
+          <a:lstStyle>
+            <a:lvl1pPr algn="ctr">
               <a:defRPr b="1" i="1" sz="3200"/>
-            </a:pPr>
-            <a:r>
-              <a:t>Vielen Dank für </a:t>
-            </a:r>
-            <a:r>
-              <a:t>eure</a:t>
-            </a:r>
-            <a:r>
-              <a:t> Aufmerksamkeit</a:t>
-            </a:r>
-            <a:r>
-              <a:t> und viel Erfolg bei den Prüfungen !</a:t>
+            </a:lvl1pPr>
+          </a:lstStyle>
+          <a:p>
+            <a:pPr/>
+            <a:r>
+              <a:t>Vielen Dank für eure Aufmerksamkeit und viel Erfolg bei den Prüfungen !</a:t>
             </a:r>
           </a:p>
         </p:txBody>
@@ -4046,8 +4036,8 @@
         </p:blipFill>
         <p:spPr>
           <a:xfrm>
-            <a:off x="795214" y="2306223"/>
-            <a:ext cx="914404" cy="914403"/>
+            <a:off x="795214" y="2306222"/>
+            <a:ext cx="914404" cy="914404"/>
           </a:xfrm>
           <a:prstGeom prst="rect">
             <a:avLst/>
@@ -4102,8 +4092,8 @@
         </p:nvSpPr>
         <p:spPr>
           <a:xfrm>
-            <a:off x="-16629" y="720436"/>
-            <a:ext cx="3088632" cy="5"/>
+            <a:off x="-16630" y="720436"/>
+            <a:ext cx="3088634" cy="6"/>
           </a:xfrm>
           <a:prstGeom prst="line">
             <a:avLst/>
@@ -4178,7 +4168,7 @@
         <p:spPr>
           <a:xfrm>
             <a:off x="795214" y="1241306"/>
-            <a:ext cx="914403" cy="914404"/>
+            <a:ext cx="914404" cy="914404"/>
           </a:xfrm>
           <a:prstGeom prst="rect">
             <a:avLst/>
@@ -4207,7 +4197,7 @@
         <p:spPr>
           <a:xfrm>
             <a:off x="795217" y="3421174"/>
-            <a:ext cx="914401" cy="914405"/>
+            <a:ext cx="914401" cy="914406"/>
           </a:xfrm>
           <a:prstGeom prst="rect">
             <a:avLst/>
@@ -4236,7 +4226,7 @@
         <p:spPr>
           <a:xfrm>
             <a:off x="795214" y="4536125"/>
-            <a:ext cx="914402" cy="914402"/>
+            <a:ext cx="914403" cy="914403"/>
           </a:xfrm>
           <a:prstGeom prst="rect">
             <a:avLst/>
@@ -4444,7 +4434,7 @@
         </p:nvSpPr>
         <p:spPr>
           <a:xfrm>
-            <a:off x="11169739" y="6404291"/>
+            <a:off x="11169739" y="6404290"/>
             <a:ext cx="184057" cy="269237"/>
           </a:xfrm>
           <a:prstGeom prst="rect">
@@ -4483,8 +4473,8 @@
         </p:blipFill>
         <p:spPr>
           <a:xfrm>
-            <a:off x="795214" y="2306223"/>
-            <a:ext cx="914404" cy="914403"/>
+            <a:off x="795214" y="2306222"/>
+            <a:ext cx="914404" cy="914404"/>
           </a:xfrm>
           <a:prstGeom prst="rect">
             <a:avLst/>
@@ -4539,8 +4529,8 @@
         </p:nvSpPr>
         <p:spPr>
           <a:xfrm>
-            <a:off x="-16629" y="720436"/>
-            <a:ext cx="3088632" cy="4"/>
+            <a:off x="-16630" y="720436"/>
+            <a:ext cx="3088634" cy="5"/>
           </a:xfrm>
           <a:prstGeom prst="line">
             <a:avLst/>
@@ -4615,7 +4605,7 @@
         <p:spPr>
           <a:xfrm>
             <a:off x="795214" y="1241306"/>
-            <a:ext cx="914403" cy="914404"/>
+            <a:ext cx="914404" cy="914404"/>
           </a:xfrm>
           <a:prstGeom prst="rect">
             <a:avLst/>
@@ -4644,7 +4634,7 @@
         <p:spPr>
           <a:xfrm>
             <a:off x="795217" y="3421174"/>
-            <a:ext cx="914401" cy="914405"/>
+            <a:ext cx="914401" cy="914406"/>
           </a:xfrm>
           <a:prstGeom prst="rect">
             <a:avLst/>
@@ -4673,7 +4663,7 @@
         <p:spPr>
           <a:xfrm>
             <a:off x="795214" y="4536125"/>
-            <a:ext cx="914402" cy="914402"/>
+            <a:ext cx="914403" cy="914403"/>
           </a:xfrm>
           <a:prstGeom prst="rect">
             <a:avLst/>
@@ -4830,7 +4820,7 @@
         <p:spPr>
           <a:xfrm>
             <a:off x="-16629" y="720436"/>
-            <a:ext cx="5719161" cy="2"/>
+            <a:ext cx="5719162" cy="3"/>
           </a:xfrm>
           <a:prstGeom prst="line">
             <a:avLst/>
@@ -4888,7 +4878,7 @@
       </p:pic>
       <p:pic>
         <p:nvPicPr>
-          <p:cNvPr id="158" name="skip-bro_screenshot.png"/>
+          <p:cNvPr id="158" name="image11.png"/>
           <p:cNvPicPr>
             <a:picLocks noChangeAspect="1"/>
           </p:cNvPicPr>
@@ -4904,8 +4894,8 @@
         </p:blipFill>
         <p:spPr>
           <a:xfrm>
-            <a:off x="1975362" y="981178"/>
-            <a:ext cx="8241276" cy="5168978"/>
+            <a:off x="1975361" y="981177"/>
+            <a:ext cx="8241278" cy="5168979"/>
           </a:xfrm>
           <a:prstGeom prst="rect">
             <a:avLst/>
@@ -5113,7 +5103,7 @@
         </p:nvSpPr>
         <p:spPr>
           <a:xfrm>
-            <a:off x="11169739" y="6404291"/>
+            <a:off x="11169739" y="6404290"/>
             <a:ext cx="184057" cy="269237"/>
           </a:xfrm>
           <a:prstGeom prst="rect">
@@ -5152,8 +5142,8 @@
         </p:blipFill>
         <p:spPr>
           <a:xfrm>
-            <a:off x="795214" y="2306223"/>
-            <a:ext cx="914404" cy="914403"/>
+            <a:off x="795214" y="2306222"/>
+            <a:ext cx="914404" cy="914404"/>
           </a:xfrm>
           <a:prstGeom prst="rect">
             <a:avLst/>
@@ -5208,8 +5198,8 @@
         </p:nvSpPr>
         <p:spPr>
           <a:xfrm>
-            <a:off x="-16629" y="720436"/>
-            <a:ext cx="3088632" cy="4"/>
+            <a:off x="-16630" y="720436"/>
+            <a:ext cx="3088634" cy="5"/>
           </a:xfrm>
           <a:prstGeom prst="line">
             <a:avLst/>
@@ -5284,7 +5274,7 @@
         <p:spPr>
           <a:xfrm>
             <a:off x="795214" y="1241306"/>
-            <a:ext cx="914403" cy="914404"/>
+            <a:ext cx="914404" cy="914404"/>
           </a:xfrm>
           <a:prstGeom prst="rect">
             <a:avLst/>
@@ -5313,7 +5303,7 @@
         <p:spPr>
           <a:xfrm>
             <a:off x="795217" y="3421174"/>
-            <a:ext cx="914401" cy="914405"/>
+            <a:ext cx="914401" cy="914406"/>
           </a:xfrm>
           <a:prstGeom prst="rect">
             <a:avLst/>
@@ -5342,7 +5332,7 @@
         <p:spPr>
           <a:xfrm>
             <a:off x="795214" y="4536125"/>
-            <a:ext cx="914402" cy="914402"/>
+            <a:ext cx="914403" cy="914403"/>
           </a:xfrm>
           <a:prstGeom prst="rect">
             <a:avLst/>
@@ -5589,8 +5579,8 @@
         </p:blipFill>
         <p:spPr>
           <a:xfrm>
-            <a:off x="795214" y="2306223"/>
-            <a:ext cx="914404" cy="914403"/>
+            <a:off x="795214" y="2306222"/>
+            <a:ext cx="914404" cy="914404"/>
           </a:xfrm>
           <a:prstGeom prst="rect">
             <a:avLst/>
@@ -5645,8 +5635,8 @@
         </p:nvSpPr>
         <p:spPr>
           <a:xfrm>
-            <a:off x="-16629" y="720436"/>
-            <a:ext cx="3088632" cy="5"/>
+            <a:off x="-16630" y="720436"/>
+            <a:ext cx="3088634" cy="6"/>
           </a:xfrm>
           <a:prstGeom prst="line">
             <a:avLst/>
@@ -5721,7 +5711,7 @@
         <p:spPr>
           <a:xfrm>
             <a:off x="795214" y="1241306"/>
-            <a:ext cx="914403" cy="914404"/>
+            <a:ext cx="914404" cy="914404"/>
           </a:xfrm>
           <a:prstGeom prst="rect">
             <a:avLst/>
@@ -5750,7 +5740,7 @@
         <p:spPr>
           <a:xfrm>
             <a:off x="795217" y="3421174"/>
-            <a:ext cx="914401" cy="914405"/>
+            <a:ext cx="914401" cy="914406"/>
           </a:xfrm>
           <a:prstGeom prst="rect">
             <a:avLst/>
@@ -5779,7 +5769,7 @@
         <p:spPr>
           <a:xfrm>
             <a:off x="795214" y="4536125"/>
-            <a:ext cx="914402" cy="914402"/>
+            <a:ext cx="914403" cy="914403"/>
           </a:xfrm>
           <a:prstGeom prst="rect">
             <a:avLst/>
@@ -5935,8 +5925,8 @@
         </p:nvSpPr>
         <p:spPr>
           <a:xfrm>
-            <a:off x="-11086" y="720436"/>
-            <a:ext cx="4584007" cy="5"/>
+            <a:off x="-11087" y="720436"/>
+            <a:ext cx="4584009" cy="6"/>
           </a:xfrm>
           <a:prstGeom prst="line">
             <a:avLst/>
@@ -6000,7 +5990,7 @@
         </p:nvSpPr>
         <p:spPr>
           <a:xfrm>
-            <a:off x="848484" y="1703706"/>
+            <a:off x="848483" y="1703706"/>
             <a:ext cx="5392888" cy="3450587"/>
           </a:xfrm>
           <a:prstGeom prst="rect">
@@ -6021,7 +6011,7 @@
           </a:bodyPr>
           <a:lstStyle/>
           <a:p>
-            <a:pPr marL="180473" indent="-180473">
+            <a:pPr marL="180472" indent="-180472">
               <a:lnSpc>
                 <a:spcPct val="150000"/>
               </a:lnSpc>
@@ -6034,7 +6024,7 @@
             </a:r>
           </a:p>
           <a:p>
-            <a:pPr marL="180473" indent="-180473">
+            <a:pPr marL="180472" indent="-180472">
               <a:lnSpc>
                 <a:spcPct val="120000"/>
               </a:lnSpc>
@@ -6047,7 +6037,7 @@
             </a:r>
           </a:p>
           <a:p>
-            <a:pPr lvl="1" marL="561473" indent="-180473">
+            <a:pPr lvl="1" marL="561472" indent="-180472">
               <a:lnSpc>
                 <a:spcPct val="120000"/>
               </a:lnSpc>
@@ -6060,7 +6050,7 @@
             </a:r>
           </a:p>
           <a:p>
-            <a:pPr lvl="1" marL="561473" indent="-180473">
+            <a:pPr lvl="1" marL="561472" indent="-180472">
               <a:lnSpc>
                 <a:spcPct val="120000"/>
               </a:lnSpc>
@@ -6073,7 +6063,7 @@
             </a:r>
           </a:p>
           <a:p>
-            <a:pPr lvl="1" marL="561473" indent="-180473">
+            <a:pPr lvl="1" marL="561472" indent="-180472">
               <a:lnSpc>
                 <a:spcPct val="150000"/>
               </a:lnSpc>
@@ -6086,7 +6076,7 @@
             </a:r>
           </a:p>
           <a:p>
-            <a:pPr marL="180473" indent="-180473">
+            <a:pPr marL="180472" indent="-180472">
               <a:lnSpc>
                 <a:spcPct val="120000"/>
               </a:lnSpc>
@@ -6099,7 +6089,7 @@
             </a:r>
           </a:p>
           <a:p>
-            <a:pPr lvl="1" marL="561473" indent="-180473">
+            <a:pPr lvl="1" marL="561472" indent="-180472">
               <a:lnSpc>
                 <a:spcPct val="150000"/>
               </a:lnSpc>
@@ -6112,7 +6102,7 @@
             </a:r>
           </a:p>
           <a:p>
-            <a:pPr marL="180473" indent="-180473">
+            <a:pPr marL="180472" indent="-180472">
               <a:lnSpc>
                 <a:spcPct val="120000"/>
               </a:lnSpc>
@@ -6125,7 +6115,7 @@
             </a:r>
           </a:p>
           <a:p>
-            <a:pPr lvl="1" marL="561473" indent="-180473">
+            <a:pPr lvl="1" marL="561472" indent="-180472">
               <a:lnSpc>
                 <a:spcPct val="120000"/>
               </a:lnSpc>
@@ -6376,8 +6366,8 @@
         </p:blipFill>
         <p:spPr>
           <a:xfrm>
-            <a:off x="795214" y="2306223"/>
-            <a:ext cx="914404" cy="914403"/>
+            <a:off x="795214" y="2306222"/>
+            <a:ext cx="914404" cy="914404"/>
           </a:xfrm>
           <a:prstGeom prst="rect">
             <a:avLst/>
@@ -6432,8 +6422,8 @@
         </p:nvSpPr>
         <p:spPr>
           <a:xfrm>
-            <a:off x="-16629" y="720436"/>
-            <a:ext cx="3088632" cy="5"/>
+            <a:off x="-16630" y="720436"/>
+            <a:ext cx="3088634" cy="6"/>
           </a:xfrm>
           <a:prstGeom prst="line">
             <a:avLst/>
@@ -6508,7 +6498,7 @@
         <p:spPr>
           <a:xfrm>
             <a:off x="795214" y="1241306"/>
-            <a:ext cx="914403" cy="914404"/>
+            <a:ext cx="914404" cy="914404"/>
           </a:xfrm>
           <a:prstGeom prst="rect">
             <a:avLst/>
@@ -6537,7 +6527,7 @@
         <p:spPr>
           <a:xfrm>
             <a:off x="795217" y="3421174"/>
-            <a:ext cx="914401" cy="914405"/>
+            <a:ext cx="914401" cy="914406"/>
           </a:xfrm>
           <a:prstGeom prst="rect">
             <a:avLst/>
@@ -6566,7 +6556,7 @@
         <p:spPr>
           <a:xfrm>
             <a:off x="795214" y="4536125"/>
-            <a:ext cx="914402" cy="914402"/>
+            <a:ext cx="914403" cy="914403"/>
           </a:xfrm>
           <a:prstGeom prst="rect">
             <a:avLst/>
@@ -6723,7 +6713,7 @@
         <p:spPr>
           <a:xfrm>
             <a:off x="-11087" y="720436"/>
-            <a:ext cx="5268892" cy="5"/>
+            <a:ext cx="5268893" cy="6"/>
           </a:xfrm>
           <a:prstGeom prst="line">
             <a:avLst/>
@@ -6758,7 +6748,7 @@
         </p:nvSpPr>
         <p:spPr>
           <a:xfrm>
-            <a:off x="340969" y="919995"/>
+            <a:off x="340969" y="919994"/>
             <a:ext cx="9678490" cy="6400797"/>
           </a:xfrm>
           <a:prstGeom prst="rect">
@@ -6799,13 +6789,7 @@
               <a:defRPr sz="2000"/>
             </a:pPr>
             <a:r>
-              <a:t>Mehr Zeit für </a:t>
-            </a:r>
-            <a:r>
-              <a:t>N</a:t>
-            </a:r>
-            <a:r>
-              <a:t>eues einplanen</a:t>
+              <a:t>Mehr Zeit für Neues einplanen</a:t>
             </a:r>
           </a:p>
           <a:p>
@@ -6888,6 +6872,16 @@
             </a:r>
           </a:p>
           <a:p>
+            <a:pPr lvl="1" marL="800100" indent="-342900">
+              <a:buSzPct val="100000"/>
+              <a:buChar char="-"/>
+              <a:defRPr sz="2000"/>
+            </a:pPr>
+            <a:r>
+              <a:t>Testen auch übers JAR</a:t>
+            </a:r>
+          </a:p>
+          <a:p>
             <a:pPr lvl="1" indent="457200">
               <a:defRPr sz="2000"/>
             </a:pPr>
@@ -6910,13 +6904,13 @@
             <a:pPr lvl="1" marL="581525" indent="-200525">
               <a:buSzPct val="100000"/>
               <a:buChar char="-"/>
-              <a:defRPr sz="2000"/>
+              <a:defRPr b="1" sz="2000"/>
             </a:pPr>
             <a:r>
-              <a:rPr b="1"/>
               <a:t>Z</a:t>
             </a:r>
             <a:r>
+              <a:rPr b="0"/>
               <a:t>u Beginn Überlegungen zu den Tests</a:t>
             </a:r>
           </a:p>
@@ -6957,13 +6951,6 @@
           </a:p>
           <a:p>
             <a:pPr lvl="1" indent="457200">
-              <a:defRPr sz="2000"/>
-            </a:pPr>
-          </a:p>
-          <a:p>
-            <a:pPr lvl="1" marL="800100" indent="-342900">
-              <a:buSzPct val="100000"/>
-              <a:buChar char="-"/>
               <a:defRPr sz="2000"/>
             </a:pPr>
           </a:p>
@@ -7000,7 +6987,7 @@
       </p:pic>
       <p:pic>
         <p:nvPicPr>
-          <p:cNvPr id="206" name="image11.png" descr="Harvey Balls 20%"/>
+          <p:cNvPr id="206" name="image12.png" descr="Harvey Balls 20%"/>
           <p:cNvPicPr>
             <a:picLocks noChangeAspect="1"/>
           </p:cNvPicPr>
@@ -7017,7 +7004,7 @@
         <p:spPr>
           <a:xfrm>
             <a:off x="7688804" y="656705"/>
-            <a:ext cx="914400" cy="914400"/>
+            <a:ext cx="914401" cy="914401"/>
           </a:xfrm>
           <a:prstGeom prst="rect">
             <a:avLst/>
@@ -7045,8 +7032,8 @@
         </p:blipFill>
         <p:spPr>
           <a:xfrm>
-            <a:off x="8765924" y="4863455"/>
-            <a:ext cx="914401" cy="914401"/>
+            <a:off x="8765923" y="4863455"/>
+            <a:ext cx="914402" cy="914402"/>
           </a:xfrm>
           <a:prstGeom prst="rect">
             <a:avLst/>
@@ -7058,7 +7045,7 @@
       </p:pic>
       <p:pic>
         <p:nvPicPr>
-          <p:cNvPr id="208" name="image15.png" descr="Irre komische Gesichtskontur"/>
+          <p:cNvPr id="208" name="image14.png" descr="Irre komische Gesichtskontur"/>
           <p:cNvPicPr>
             <a:picLocks noChangeAspect="1"/>
           </p:cNvPicPr>
@@ -7075,7 +7062,7 @@
         <p:spPr>
           <a:xfrm>
             <a:off x="8773468" y="1113904"/>
-            <a:ext cx="914401" cy="914401"/>
+            <a:ext cx="914402" cy="914401"/>
           </a:xfrm>
           <a:prstGeom prst="rect">
             <a:avLst/>
@@ -7087,7 +7074,7 @@
       </p:pic>
       <p:pic>
         <p:nvPicPr>
-          <p:cNvPr id="209" name="image17.png" descr="Höhlenzeichnung"/>
+          <p:cNvPr id="209" name="image15.png" descr="Höhlenzeichnung"/>
           <p:cNvPicPr>
             <a:picLocks noChangeAspect="1"/>
           </p:cNvPicPr>
@@ -7103,8 +7090,8 @@
         </p:blipFill>
         <p:spPr>
           <a:xfrm>
-            <a:off x="8765924" y="2872046"/>
-            <a:ext cx="914401" cy="914401"/>
+            <a:off x="8765923" y="2872046"/>
+            <a:ext cx="914402" cy="914401"/>
           </a:xfrm>
           <a:prstGeom prst="rect">
             <a:avLst/>
@@ -7116,7 +7103,7 @@
       </p:pic>
       <p:pic>
         <p:nvPicPr>
-          <p:cNvPr id="210" name="image19.png" descr="Klemmbrett teilweise angekreuzt"/>
+          <p:cNvPr id="210" name="image16.png" descr="Klemmbrett teilweise angekreuzt"/>
           <p:cNvPicPr>
             <a:picLocks noChangeAspect="1"/>
           </p:cNvPicPr>
@@ -7145,7 +7132,7 @@
       </p:pic>
       <p:pic>
         <p:nvPicPr>
-          <p:cNvPr id="211" name="image21.png" descr="Management"/>
+          <p:cNvPr id="211" name="image17.png" descr="Management"/>
           <p:cNvPicPr>
             <a:picLocks noChangeAspect="1"/>
           </p:cNvPicPr>
@@ -7162,7 +7149,7 @@
         <p:spPr>
           <a:xfrm>
             <a:off x="7684647" y="2414846"/>
-            <a:ext cx="914401" cy="914401"/>
+            <a:ext cx="914402" cy="914401"/>
           </a:xfrm>
           <a:prstGeom prst="rect">
             <a:avLst/>
@@ -7174,7 +7161,7 @@
       </p:pic>
       <p:pic>
         <p:nvPicPr>
-          <p:cNvPr id="212" name="image23.png" descr="Psychische Gesundheit"/>
+          <p:cNvPr id="212" name="image18.png" descr="Psychische Gesundheit"/>
           <p:cNvPicPr>
             <a:picLocks noChangeAspect="1"/>
           </p:cNvPicPr>
@@ -7191,7 +7178,7 @@
         <p:spPr>
           <a:xfrm>
             <a:off x="9884161" y="3329247"/>
-            <a:ext cx="914401" cy="914401"/>
+            <a:ext cx="914401" cy="914402"/>
           </a:xfrm>
           <a:prstGeom prst="rect">
             <a:avLst/>
@@ -7203,7 +7190,7 @@
       </p:pic>
       <p:pic>
         <p:nvPicPr>
-          <p:cNvPr id="213" name="image25.png" descr="Künstliche Intelligenz"/>
+          <p:cNvPr id="213" name="image19.png" descr="Künstliche Intelligenz"/>
           <p:cNvPicPr>
             <a:picLocks noChangeAspect="1"/>
           </p:cNvPicPr>
@@ -7220,7 +7207,7 @@
         <p:spPr>
           <a:xfrm>
             <a:off x="7684647" y="4406255"/>
-            <a:ext cx="914401" cy="914401"/>
+            <a:ext cx="914402" cy="914402"/>
           </a:xfrm>
           <a:prstGeom prst="rect">
             <a:avLst/>
@@ -7232,7 +7219,7 @@
       </p:pic>
       <p:pic>
         <p:nvPicPr>
-          <p:cNvPr id="214" name="image27.png" descr="Blaupause"/>
+          <p:cNvPr id="214" name="image20.png" descr="Blaupause"/>
           <p:cNvPicPr>
             <a:picLocks noChangeAspect="1"/>
           </p:cNvPicPr>
@@ -7249,7 +7236,7 @@
         <p:spPr>
           <a:xfrm>
             <a:off x="9884161" y="5320655"/>
-            <a:ext cx="914401" cy="914401"/>
+            <a:ext cx="914401" cy="914402"/>
           </a:xfrm>
           <a:prstGeom prst="rect">
             <a:avLst/>
@@ -7353,7 +7340,7 @@
                             </p:stCondLst>
                             <p:childTnLst>
                               <p:par>
-                                <p:cTn id="10" presetClass="entr" nodeType="afterEffect" presetSubtype="0" presetID="1" grpId="2" fill="hold">
+                                <p:cTn id="10" presetClass="entr" nodeType="afterEffect" presetSubtype="0" presetID="1" grpId="1" fill="hold">
                                   <p:stCondLst>
                                     <p:cond delay="0"/>
                                   </p:stCondLst>
@@ -7365,7 +7352,11 @@
                                       <p:cBhvr>
                                         <p:cTn id="11" fill="hold"/>
                                         <p:tgtEl>
-                                          <p:spTgt spid="206"/>
+                                          <p:spTgt spid="204">
+                                            <p:txEl>
+                                              <p:pRg st="1" end="1"/>
+                                            </p:txEl>
+                                          </p:spTgt>
                                         </p:tgtEl>
                                         <p:attrNameLst>
                                           <p:attrName>style.visibility</p:attrName>
@@ -7388,7 +7379,7 @@
                             </p:stCondLst>
                             <p:childTnLst>
                               <p:par>
-                                <p:cTn id="13" presetClass="entr" nodeType="afterEffect" presetSubtype="0" presetID="1" grpId="3" fill="hold">
+                                <p:cTn id="13" presetClass="entr" nodeType="afterEffect" presetSubtype="0" presetID="1" grpId="2" fill="hold">
                                   <p:stCondLst>
                                     <p:cond delay="0"/>
                                   </p:stCondLst>
@@ -7400,7 +7391,7 @@
                                       <p:cBhvr>
                                         <p:cTn id="14" fill="hold"/>
                                         <p:tgtEl>
-                                          <p:spTgt spid="208"/>
+                                          <p:spTgt spid="206"/>
                                         </p:tgtEl>
                                         <p:attrNameLst>
                                           <p:attrName>style.visibility</p:attrName>
@@ -7423,7 +7414,7 @@
                             </p:stCondLst>
                             <p:childTnLst>
                               <p:par>
-                                <p:cTn id="16" presetClass="entr" nodeType="afterEffect" presetSubtype="0" presetID="1" grpId="4" fill="hold">
+                                <p:cTn id="16" presetClass="entr" nodeType="afterEffect" presetSubtype="0" presetID="1" grpId="3" fill="hold">
                                   <p:stCondLst>
                                     <p:cond delay="0"/>
                                   </p:stCondLst>
@@ -7435,7 +7426,7 @@
                                       <p:cBhvr>
                                         <p:cTn id="17" fill="hold"/>
                                         <p:tgtEl>
-                                          <p:spTgt spid="210"/>
+                                          <p:spTgt spid="208"/>
                                         </p:tgtEl>
                                         <p:attrNameLst>
                                           <p:attrName>style.visibility</p:attrName>
@@ -7458,7 +7449,7 @@
                             </p:stCondLst>
                             <p:childTnLst>
                               <p:par>
-                                <p:cTn id="19" presetClass="entr" nodeType="afterEffect" presetSubtype="0" presetID="1" grpId="1" fill="hold">
+                                <p:cTn id="19" presetClass="entr" nodeType="afterEffect" presetSubtype="0" presetID="1" grpId="4" fill="hold">
                                   <p:stCondLst>
                                     <p:cond delay="0"/>
                                   </p:stCondLst>
@@ -7470,11 +7461,7 @@
                                       <p:cBhvr>
                                         <p:cTn id="20" fill="hold"/>
                                         <p:tgtEl>
-                                          <p:spTgt spid="204">
-                                            <p:txEl>
-                                              <p:pRg st="1" end="1"/>
-                                            </p:txEl>
-                                          </p:spTgt>
+                                          <p:spTgt spid="210"/>
                                         </p:tgtEl>
                                         <p:attrNameLst>
                                           <p:attrName>style.visibility</p:attrName>
@@ -7607,23 +7594,14 @@
                             </p:childTnLst>
                           </p:cTn>
                         </p:par>
-                      </p:childTnLst>
-                    </p:cTn>
-                  </p:par>
-                  <p:par>
-                    <p:cTn id="30" fill="hold">
-                      <p:stCondLst>
-                        <p:cond delay="indefinite"/>
-                      </p:stCondLst>
-                      <p:childTnLst>
                         <p:par>
-                          <p:cTn id="31" fill="hold">
+                          <p:cTn id="30" fill="hold">
                             <p:stCondLst>
                               <p:cond delay="0"/>
                             </p:stCondLst>
                             <p:childTnLst>
                               <p:par>
-                                <p:cTn id="32" presetClass="entr" nodeType="clickEffect" presetSubtype="0" presetID="1" grpId="1" fill="hold">
+                                <p:cTn id="31" presetClass="entr" nodeType="afterEffect" presetSubtype="0" presetID="1" grpId="1" fill="hold">
                                   <p:stCondLst>
                                     <p:cond delay="0"/>
                                   </p:stCondLst>
@@ -7633,7 +7611,7 @@
                                   <p:childTnLst>
                                     <p:set>
                                       <p:cBhvr>
-                                        <p:cTn id="33" fill="hold"/>
+                                        <p:cTn id="32" fill="hold"/>
                                         <p:tgtEl>
                                           <p:spTgt spid="204">
                                             <p:txEl>
@@ -7655,6 +7633,15 @@
                             </p:childTnLst>
                           </p:cTn>
                         </p:par>
+                      </p:childTnLst>
+                    </p:cTn>
+                  </p:par>
+                  <p:par>
+                    <p:cTn id="33" fill="hold">
+                      <p:stCondLst>
+                        <p:cond delay="indefinite"/>
+                      </p:stCondLst>
+                      <p:childTnLst>
                         <p:par>
                           <p:cTn id="34" fill="hold">
                             <p:stCondLst>
@@ -7662,7 +7649,7 @@
                             </p:stCondLst>
                             <p:childTnLst>
                               <p:par>
-                                <p:cTn id="35" presetClass="entr" nodeType="afterEffect" presetSubtype="0" presetID="1" grpId="1" fill="hold">
+                                <p:cTn id="35" presetClass="entr" nodeType="clickEffect" presetSubtype="0" presetID="1" grpId="1" fill="hold">
                                   <p:stCondLst>
                                     <p:cond delay="0"/>
                                   </p:stCondLst>
@@ -7740,7 +7727,7 @@
                             </p:stCondLst>
                             <p:childTnLst>
                               <p:par>
-                                <p:cTn id="41" presetClass="entr" nodeType="afterEffect" presetSubtype="0" presetID="1" grpId="5" fill="hold">
+                                <p:cTn id="41" presetClass="entr" nodeType="afterEffect" presetSubtype="0" presetID="1" grpId="1" fill="hold">
                                   <p:stCondLst>
                                     <p:cond delay="0"/>
                                   </p:stCondLst>
@@ -7752,7 +7739,11 @@
                                       <p:cBhvr>
                                         <p:cTn id="42" fill="hold"/>
                                         <p:tgtEl>
-                                          <p:spTgt spid="211"/>
+                                          <p:spTgt spid="204">
+                                            <p:txEl>
+                                              <p:pRg st="8" end="8"/>
+                                            </p:txEl>
+                                          </p:spTgt>
                                         </p:tgtEl>
                                         <p:attrNameLst>
                                           <p:attrName>style.visibility</p:attrName>
@@ -7775,7 +7766,7 @@
                             </p:stCondLst>
                             <p:childTnLst>
                               <p:par>
-                                <p:cTn id="44" presetClass="entr" nodeType="afterEffect" presetSubtype="0" presetID="1" grpId="6" fill="hold">
+                                <p:cTn id="44" presetClass="entr" nodeType="afterEffect" presetSubtype="0" presetID="1" grpId="5" fill="hold">
                                   <p:stCondLst>
                                     <p:cond delay="0"/>
                                   </p:stCondLst>
@@ -7787,7 +7778,7 @@
                                       <p:cBhvr>
                                         <p:cTn id="45" fill="hold"/>
                                         <p:tgtEl>
-                                          <p:spTgt spid="209"/>
+                                          <p:spTgt spid="211"/>
                                         </p:tgtEl>
                                         <p:attrNameLst>
                                           <p:attrName>style.visibility</p:attrName>
@@ -7810,7 +7801,7 @@
                             </p:stCondLst>
                             <p:childTnLst>
                               <p:par>
-                                <p:cTn id="47" presetClass="entr" nodeType="afterEffect" presetSubtype="0" presetID="1" grpId="7" fill="hold">
+                                <p:cTn id="47" presetClass="entr" nodeType="afterEffect" presetSubtype="0" presetID="1" grpId="6" fill="hold">
                                   <p:stCondLst>
                                     <p:cond delay="0"/>
                                   </p:stCondLst>
@@ -7822,7 +7813,7 @@
                                       <p:cBhvr>
                                         <p:cTn id="48" fill="hold"/>
                                         <p:tgtEl>
-                                          <p:spTgt spid="212"/>
+                                          <p:spTgt spid="209"/>
                                         </p:tgtEl>
                                         <p:attrNameLst>
                                           <p:attrName>style.visibility</p:attrName>
@@ -7845,7 +7836,7 @@
                             </p:stCondLst>
                             <p:childTnLst>
                               <p:par>
-                                <p:cTn id="50" presetClass="entr" nodeType="afterEffect" presetSubtype="0" presetID="1" grpId="1" fill="hold">
+                                <p:cTn id="50" presetClass="entr" nodeType="afterEffect" presetSubtype="0" presetID="1" grpId="7" fill="hold">
                                   <p:stCondLst>
                                     <p:cond delay="0"/>
                                   </p:stCondLst>
@@ -7857,11 +7848,7 @@
                                       <p:cBhvr>
                                         <p:cTn id="51" fill="hold"/>
                                         <p:tgtEl>
-                                          <p:spTgt spid="204">
-                                            <p:txEl>
-                                              <p:pRg st="8" end="8"/>
-                                            </p:txEl>
-                                          </p:spTgt>
+                                          <p:spTgt spid="212"/>
                                         </p:tgtEl>
                                         <p:attrNameLst>
                                           <p:attrName>style.visibility</p:attrName>
@@ -7955,23 +7942,14 @@
                             </p:childTnLst>
                           </p:cTn>
                         </p:par>
-                      </p:childTnLst>
-                    </p:cTn>
-                  </p:par>
-                  <p:par>
-                    <p:cTn id="58" fill="hold">
-                      <p:stCondLst>
-                        <p:cond delay="indefinite"/>
-                      </p:stCondLst>
-                      <p:childTnLst>
                         <p:par>
-                          <p:cTn id="59" fill="hold">
+                          <p:cTn id="58" fill="hold">
                             <p:stCondLst>
                               <p:cond delay="0"/>
                             </p:stCondLst>
                             <p:childTnLst>
                               <p:par>
-                                <p:cTn id="60" presetClass="entr" nodeType="clickEffect" presetSubtype="0" presetID="1" grpId="1" fill="hold">
+                                <p:cTn id="59" presetClass="entr" nodeType="afterEffect" presetSubtype="0" presetID="1" grpId="1" fill="hold">
                                   <p:stCondLst>
                                     <p:cond delay="0"/>
                                   </p:stCondLst>
@@ -7981,7 +7959,7 @@
                                   <p:childTnLst>
                                     <p:set>
                                       <p:cBhvr>
-                                        <p:cTn id="61" fill="hold"/>
+                                        <p:cTn id="60" fill="hold"/>
                                         <p:tgtEl>
                                           <p:spTgt spid="204">
                                             <p:txEl>
@@ -8003,6 +7981,15 @@
                             </p:childTnLst>
                           </p:cTn>
                         </p:par>
+                      </p:childTnLst>
+                    </p:cTn>
+                  </p:par>
+                  <p:par>
+                    <p:cTn id="61" fill="hold">
+                      <p:stCondLst>
+                        <p:cond delay="indefinite"/>
+                      </p:stCondLst>
+                      <p:childTnLst>
                         <p:par>
                           <p:cTn id="62" fill="hold">
                             <p:stCondLst>
@@ -8010,7 +7997,7 @@
                             </p:stCondLst>
                             <p:childTnLst>
                               <p:par>
-                                <p:cTn id="63" presetClass="entr" nodeType="afterEffect" presetSubtype="0" presetID="1" grpId="1" fill="hold">
+                                <p:cTn id="63" presetClass="entr" nodeType="clickEffect" presetSubtype="0" presetID="1" grpId="1" fill="hold">
                                   <p:stCondLst>
                                     <p:cond delay="0"/>
                                   </p:stCondLst>
@@ -8127,7 +8114,7 @@
                             </p:stCondLst>
                             <p:childTnLst>
                               <p:par>
-                                <p:cTn id="72" presetClass="entr" nodeType="afterEffect" presetSubtype="0" presetID="1" grpId="8" fill="hold">
+                                <p:cTn id="72" presetClass="entr" nodeType="afterEffect" presetSubtype="0" presetID="1" grpId="1" fill="hold">
                                   <p:stCondLst>
                                     <p:cond delay="0"/>
                                   </p:stCondLst>
@@ -8139,7 +8126,11 @@
                                       <p:cBhvr>
                                         <p:cTn id="73" fill="hold"/>
                                         <p:tgtEl>
-                                          <p:spTgt spid="213"/>
+                                          <p:spTgt spid="204">
+                                            <p:txEl>
+                                              <p:pRg st="15" end="15"/>
+                                            </p:txEl>
+                                          </p:spTgt>
                                         </p:tgtEl>
                                         <p:attrNameLst>
                                           <p:attrName>style.visibility</p:attrName>
@@ -8162,7 +8153,7 @@
                             </p:stCondLst>
                             <p:childTnLst>
                               <p:par>
-                                <p:cTn id="75" presetClass="entr" nodeType="afterEffect" presetSubtype="0" presetID="1" grpId="9" fill="hold">
+                                <p:cTn id="75" presetClass="entr" nodeType="afterEffect" presetSubtype="0" presetID="1" grpId="8" fill="hold">
                                   <p:stCondLst>
                                     <p:cond delay="0"/>
                                   </p:stCondLst>
@@ -8174,7 +8165,7 @@
                                       <p:cBhvr>
                                         <p:cTn id="76" fill="hold"/>
                                         <p:tgtEl>
-                                          <p:spTgt spid="207"/>
+                                          <p:spTgt spid="213"/>
                                         </p:tgtEl>
                                         <p:attrNameLst>
                                           <p:attrName>style.visibility</p:attrName>
@@ -8197,7 +8188,7 @@
                             </p:stCondLst>
                             <p:childTnLst>
                               <p:par>
-                                <p:cTn id="78" presetClass="entr" nodeType="afterEffect" presetSubtype="0" presetID="1" grpId="10" fill="hold">
+                                <p:cTn id="78" presetClass="entr" nodeType="afterEffect" presetSubtype="0" presetID="1" grpId="9" fill="hold">
                                   <p:stCondLst>
                                     <p:cond delay="0"/>
                                   </p:stCondLst>
@@ -8208,6 +8199,41 @@
                                     <p:set>
                                       <p:cBhvr>
                                         <p:cTn id="79" fill="hold"/>
+                                        <p:tgtEl>
+                                          <p:spTgt spid="207"/>
+                                        </p:tgtEl>
+                                        <p:attrNameLst>
+                                          <p:attrName>style.visibility</p:attrName>
+                                        </p:attrNameLst>
+                                      </p:cBhvr>
+                                      <p:to>
+                                        <p:strVal val="visible"/>
+                                      </p:to>
+                                    </p:set>
+                                  </p:childTnLst>
+                                </p:cTn>
+                              </p:par>
+                            </p:childTnLst>
+                          </p:cTn>
+                        </p:par>
+                        <p:par>
+                          <p:cTn id="80" fill="hold">
+                            <p:stCondLst>
+                              <p:cond delay="0"/>
+                            </p:stCondLst>
+                            <p:childTnLst>
+                              <p:par>
+                                <p:cTn id="81" presetClass="entr" nodeType="afterEffect" presetSubtype="0" presetID="1" grpId="10" fill="hold">
+                                  <p:stCondLst>
+                                    <p:cond delay="0"/>
+                                  </p:stCondLst>
+                                  <p:iterate type="el" backwards="0">
+                                    <p:tmAbs val="0"/>
+                                  </p:iterate>
+                                  <p:childTnLst>
+                                    <p:set>
+                                      <p:cBhvr>
+                                        <p:cTn id="82" fill="hold"/>
                                         <p:tgtEl>
                                           <p:spTgt spid="214"/>
                                         </p:tgtEl>
@@ -8229,19 +8255,19 @@
                     </p:cTn>
                   </p:par>
                   <p:par>
-                    <p:cTn id="80" fill="hold">
+                    <p:cTn id="83" fill="hold">
                       <p:stCondLst>
                         <p:cond delay="indefinite"/>
                       </p:stCondLst>
                       <p:childTnLst>
                         <p:par>
-                          <p:cTn id="81" fill="hold">
+                          <p:cTn id="84" fill="hold">
                             <p:stCondLst>
                               <p:cond delay="0"/>
                             </p:stCondLst>
                             <p:childTnLst>
                               <p:par>
-                                <p:cTn id="82" presetClass="entr" nodeType="clickEffect" presetSubtype="0" presetID="1" grpId="1" fill="hold">
+                                <p:cTn id="85" presetClass="entr" nodeType="clickEffect" presetSubtype="0" presetID="1" grpId="1" fill="hold">
                                   <p:stCondLst>
                                     <p:cond delay="0"/>
                                   </p:stCondLst>
@@ -8251,55 +8277,7 @@
                                   <p:childTnLst>
                                     <p:set>
                                       <p:cBhvr>
-                                        <p:cTn id="83" fill="hold"/>
-                                        <p:tgtEl>
-                                          <p:spTgt spid="204">
-                                            <p:txEl>
-                                              <p:pRg st="15" end="15"/>
-                                            </p:txEl>
-                                          </p:spTgt>
-                                        </p:tgtEl>
-                                        <p:attrNameLst>
-                                          <p:attrName>style.visibility</p:attrName>
-                                        </p:attrNameLst>
-                                      </p:cBhvr>
-                                      <p:to>
-                                        <p:strVal val="visible"/>
-                                      </p:to>
-                                    </p:set>
-                                  </p:childTnLst>
-                                </p:cTn>
-                              </p:par>
-                            </p:childTnLst>
-                          </p:cTn>
-                        </p:par>
-                      </p:childTnLst>
-                    </p:cTn>
-                  </p:par>
-                  <p:par>
-                    <p:cTn id="84" fill="hold">
-                      <p:stCondLst>
-                        <p:cond delay="indefinite"/>
-                      </p:stCondLst>
-                      <p:childTnLst>
-                        <p:par>
-                          <p:cTn id="85" fill="hold">
-                            <p:stCondLst>
-                              <p:cond delay="0"/>
-                            </p:stCondLst>
-                            <p:childTnLst>
-                              <p:par>
-                                <p:cTn id="86" presetClass="entr" nodeType="clickEffect" presetSubtype="0" presetID="1" grpId="1" fill="hold">
-                                  <p:stCondLst>
-                                    <p:cond delay="0"/>
-                                  </p:stCondLst>
-                                  <p:iterate type="el" backwards="0">
-                                    <p:tmAbs val="0"/>
-                                  </p:iterate>
-                                  <p:childTnLst>
-                                    <p:set>
-                                      <p:cBhvr>
-                                        <p:cTn id="87" fill="hold"/>
+                                        <p:cTn id="86" fill="hold"/>
                                         <p:tgtEl>
                                           <p:spTgt spid="204">
                                             <p:txEl>
@@ -8325,19 +8303,19 @@
                     </p:cTn>
                   </p:par>
                   <p:par>
-                    <p:cTn id="88" fill="hold">
+                    <p:cTn id="87" fill="hold">
                       <p:stCondLst>
                         <p:cond delay="indefinite"/>
                       </p:stCondLst>
                       <p:childTnLst>
                         <p:par>
-                          <p:cTn id="89" fill="hold">
+                          <p:cTn id="88" fill="hold">
                             <p:stCondLst>
                               <p:cond delay="0"/>
                             </p:stCondLst>
                             <p:childTnLst>
                               <p:par>
-                                <p:cTn id="90" presetClass="entr" nodeType="clickEffect" presetSubtype="0" presetID="1" grpId="1" fill="hold">
+                                <p:cTn id="89" presetClass="entr" nodeType="clickEffect" presetSubtype="0" presetID="1" grpId="1" fill="hold">
                                   <p:stCondLst>
                                     <p:cond delay="0"/>
                                   </p:stCondLst>
@@ -8347,7 +8325,7 @@
                                   <p:childTnLst>
                                     <p:set>
                                       <p:cBhvr>
-                                        <p:cTn id="91" fill="hold"/>
+                                        <p:cTn id="90" fill="hold"/>
                                         <p:tgtEl>
                                           <p:spTgt spid="204">
                                             <p:txEl>
@@ -8373,19 +8351,19 @@
                     </p:cTn>
                   </p:par>
                   <p:par>
-                    <p:cTn id="92" fill="hold">
+                    <p:cTn id="91" fill="hold">
                       <p:stCondLst>
                         <p:cond delay="indefinite"/>
                       </p:stCondLst>
                       <p:childTnLst>
                         <p:par>
-                          <p:cTn id="93" fill="hold">
+                          <p:cTn id="92" fill="hold">
                             <p:stCondLst>
                               <p:cond delay="0"/>
                             </p:stCondLst>
                             <p:childTnLst>
                               <p:par>
-                                <p:cTn id="94" presetClass="entr" nodeType="clickEffect" presetSubtype="0" presetID="1" grpId="1" fill="hold">
+                                <p:cTn id="93" presetClass="entr" nodeType="clickEffect" presetSubtype="0" presetID="1" grpId="1" fill="hold">
                                   <p:stCondLst>
                                     <p:cond delay="0"/>
                                   </p:stCondLst>
@@ -8395,7 +8373,7 @@
                                   <p:childTnLst>
                                     <p:set>
                                       <p:cBhvr>
-                                        <p:cTn id="95" fill="hold"/>
+                                        <p:cTn id="94" fill="hold"/>
                                         <p:tgtEl>
                                           <p:spTgt spid="204">
                                             <p:txEl>
@@ -8421,19 +8399,19 @@
                     </p:cTn>
                   </p:par>
                   <p:par>
-                    <p:cTn id="96" fill="hold">
+                    <p:cTn id="95" fill="hold">
                       <p:stCondLst>
                         <p:cond delay="indefinite"/>
                       </p:stCondLst>
                       <p:childTnLst>
                         <p:par>
-                          <p:cTn id="97" fill="hold">
+                          <p:cTn id="96" fill="hold">
                             <p:stCondLst>
                               <p:cond delay="0"/>
                             </p:stCondLst>
                             <p:childTnLst>
                               <p:par>
-                                <p:cTn id="98" presetClass="entr" nodeType="clickEffect" presetSubtype="0" presetID="1" grpId="1" fill="hold">
+                                <p:cTn id="97" presetClass="entr" nodeType="clickEffect" presetSubtype="0" presetID="1" grpId="1" fill="hold">
                                   <p:stCondLst>
                                     <p:cond delay="0"/>
                                   </p:stCondLst>
@@ -8443,7 +8421,7 @@
                                   <p:childTnLst>
                                     <p:set>
                                       <p:cBhvr>
-                                        <p:cTn id="99" fill="hold"/>
+                                        <p:cTn id="98" fill="hold"/>
                                         <p:tgtEl>
                                           <p:spTgt spid="204">
                                             <p:txEl>
@@ -8469,19 +8447,19 @@
                     </p:cTn>
                   </p:par>
                   <p:par>
-                    <p:cTn id="100" fill="hold">
+                    <p:cTn id="99" fill="hold">
                       <p:stCondLst>
                         <p:cond delay="indefinite"/>
                       </p:stCondLst>
                       <p:childTnLst>
                         <p:par>
-                          <p:cTn id="101" fill="hold">
+                          <p:cTn id="100" fill="hold">
                             <p:stCondLst>
                               <p:cond delay="0"/>
                             </p:stCondLst>
                             <p:childTnLst>
                               <p:par>
-                                <p:cTn id="102" presetClass="entr" nodeType="clickEffect" presetSubtype="0" presetID="1" grpId="1" fill="hold">
+                                <p:cTn id="101" presetClass="entr" nodeType="clickEffect" presetSubtype="0" presetID="1" grpId="1" fill="hold">
                                   <p:stCondLst>
                                     <p:cond delay="0"/>
                                   </p:stCondLst>
@@ -8491,7 +8469,7 @@
                                   <p:childTnLst>
                                     <p:set>
                                       <p:cBhvr>
-                                        <p:cTn id="103" fill="hold"/>
+                                        <p:cTn id="102" fill="hold"/>
                                         <p:tgtEl>
                                           <p:spTgt spid="204">
                                             <p:txEl>
@@ -8538,16 +8516,16 @@
       </p:par>
     </p:tnLst>
     <p:bldLst>
+      <p:bldP build="whole" bldLvl="1" animBg="1" rev="0" advAuto="0" spid="210" grpId="4"/>
+      <p:bldP build="whole" bldLvl="1" animBg="1" rev="0" advAuto="0" spid="214" grpId="10"/>
+      <p:bldP build="whole" bldLvl="1" animBg="1" rev="0" advAuto="0" spid="209" grpId="6"/>
+      <p:bldP build="whole" bldLvl="1" animBg="1" rev="0" advAuto="0" spid="211" grpId="5"/>
       <p:bldP build="whole" bldLvl="1" animBg="1" rev="0" advAuto="0" spid="213" grpId="8"/>
-      <p:bldP build="whole" bldLvl="1" animBg="1" rev="0" advAuto="0" spid="211" grpId="5"/>
-      <p:bldP build="whole" bldLvl="1" animBg="1" rev="0" advAuto="0" spid="209" grpId="6"/>
+      <p:bldP build="whole" bldLvl="1" animBg="1" rev="0" advAuto="0" spid="208" grpId="3"/>
+      <p:bldP build="p" bldLvl="5" animBg="1" rev="0" advAuto="0" spid="204" grpId="1"/>
       <p:bldP build="whole" bldLvl="1" animBg="1" rev="0" advAuto="0" spid="207" grpId="9"/>
-      <p:bldP build="whole" bldLvl="1" animBg="1" rev="0" advAuto="0" spid="214" grpId="10"/>
-      <p:bldP build="p" bldLvl="5" animBg="1" rev="0" advAuto="0" spid="204" grpId="1"/>
+      <p:bldP build="whole" bldLvl="1" animBg="1" rev="0" advAuto="0" spid="206" grpId="2"/>
       <p:bldP build="whole" bldLvl="1" animBg="1" rev="0" advAuto="0" spid="212" grpId="7"/>
-      <p:bldP build="whole" bldLvl="1" animBg="1" rev="0" advAuto="0" spid="208" grpId="3"/>
-      <p:bldP build="whole" bldLvl="1" animBg="1" rev="0" advAuto="0" spid="206" grpId="2"/>
-      <p:bldP build="whole" bldLvl="1" animBg="1" rev="0" advAuto="0" spid="210" grpId="4"/>
     </p:bldLst>
   </p:timing>
 </p:sld>

</xml_diff>